<commit_message>
Deploying to gh-pages from @ nlmixr2/nonmem2rx@d97155751d239bda3d8b000380349b489244a488 🚀
</commit_message>
<xml_diff>
--- a/articles/mod-PowerPoint.pptx
+++ b/articles/mod-PowerPoint.pptx
@@ -5890,6 +5890,17 @@
                         </a:spcAft>
                         <a:buNone/>
                       </a:pPr>
+                      <a:endParaRPr cap="none" sz="1100" i="0" b="0" u="none">
+                        <a:solidFill>
+                          <a:srgbClr val="000000">
+                            <a:alpha val="100000"/>
+                          </a:srgbClr>
+                        </a:solidFill>
+                        <a:latin typeface="DejaVu Sans"/>
+                        <a:cs typeface="DejaVu Sans"/>
+                        <a:ea typeface="DejaVu Sans"/>
+                        <a:sym typeface="DejaVu Sans"/>
+                      </a:endParaRPr>
                       <a:r>
                         <a:rPr cap="none" sz="1100" i="0" b="0" u="none">
                           <a:solidFill>
@@ -5951,6 +5962,17 @@
                         </a:spcAft>
                         <a:buNone/>
                       </a:pPr>
+                      <a:endParaRPr cap="none" sz="1100" i="0" b="0" u="none">
+                        <a:solidFill>
+                          <a:srgbClr val="000000">
+                            <a:alpha val="100000"/>
+                          </a:srgbClr>
+                        </a:solidFill>
+                        <a:latin typeface="DejaVu Sans"/>
+                        <a:cs typeface="DejaVu Sans"/>
+                        <a:ea typeface="DejaVu Sans"/>
+                        <a:sym typeface="DejaVu Sans"/>
+                      </a:endParaRPr>
                       <a:r>
                         <a:rPr cap="none" sz="1100" i="0" b="0" u="none">
                           <a:solidFill>

</xml_diff>